<commit_message>
started with data shadows
</commit_message>
<xml_diff>
--- a/Resources/Other/CompoundSets/Images/DeprecateCompoundSets.pptx
+++ b/Resources/Other/CompoundSets/Images/DeprecateCompoundSets.pptx
@@ -5546,7 +5546,7 @@
         </p:nvSpPr>
         <p:spPr>
           <a:xfrm>
-            <a:off x="2581834" y="123003"/>
+            <a:off x="2667895" y="151473"/>
             <a:ext cx="5798371" cy="623943"/>
           </a:xfrm>
           <a:prstGeom prst="roundRect">
@@ -5593,8 +5593,8 @@
         </p:nvSpPr>
         <p:spPr>
           <a:xfrm>
-            <a:off x="1118794" y="832179"/>
-            <a:ext cx="9143999" cy="1762919"/>
+            <a:off x="1301672" y="822533"/>
+            <a:ext cx="9143999" cy="2060415"/>
           </a:xfrm>
           <a:prstGeom prst="ellipse">
             <a:avLst/>
@@ -5624,6 +5624,21 @@
             <a:pPr algn="ctr"/>
             <a:r>
               <a:rPr lang="en-US" dirty="0"/>
+              <a:t>Add </a:t>
+            </a:r>
+            <a:r>
+              <a:rPr lang="en-US" dirty="0" err="1"/>
+              <a:t>dcsu</a:t>
+            </a:r>
+            <a:r>
+              <a:rPr lang="en-US" dirty="0"/>
+              <a:t> library.</a:t>
+            </a:r>
+          </a:p>
+          <a:p>
+            <a:pPr algn="ctr"/>
+            <a:r>
+              <a:rPr lang="en-US" dirty="0"/>
               <a:t>Create Mapping Set Runtime Library with</a:t>
             </a:r>
           </a:p>
@@ -5645,7 +5660,7 @@
             <a:pPr algn="ctr"/>
             <a:r>
               <a:rPr lang="en-US" dirty="0"/>
-              <a:t>Manually move the Mapping Set main model</a:t>
+              <a:t>Manually move the Mapping Set To Main model</a:t>
             </a:r>
           </a:p>
           <a:p>
@@ -5671,7 +5686,7 @@
         </p:nvSpPr>
         <p:spPr>
           <a:xfrm>
-            <a:off x="2377440" y="2719502"/>
+            <a:off x="2463501" y="3031473"/>
             <a:ext cx="6207161" cy="623943"/>
           </a:xfrm>
           <a:prstGeom prst="roundRect">
@@ -5718,8 +5733,8 @@
         </p:nvSpPr>
         <p:spPr>
           <a:xfrm>
-            <a:off x="375140" y="3506217"/>
-            <a:ext cx="11501302" cy="1483540"/>
+            <a:off x="345349" y="3742884"/>
+            <a:ext cx="11501302" cy="1904879"/>
           </a:xfrm>
           <a:prstGeom prst="ellipse">
             <a:avLst/>
@@ -5773,6 +5788,21 @@
               <a:t>For each case, copy the data back to the original identifiers</a:t>
             </a:r>
           </a:p>
+          <a:p>
+            <a:pPr algn="ctr"/>
+            <a:r>
+              <a:rPr lang="en-US" dirty="0"/>
+              <a:t>Remove </a:t>
+            </a:r>
+            <a:r>
+              <a:rPr lang="en-US" dirty="0" err="1"/>
+              <a:t>dcsu</a:t>
+            </a:r>
+            <a:r>
+              <a:rPr lang="en-US" dirty="0"/>
+              <a:t> library</a:t>
+            </a:r>
+          </a:p>
         </p:txBody>
       </p:sp>
       <p:sp>
@@ -5789,7 +5819,7 @@
         </p:nvSpPr>
         <p:spPr>
           <a:xfrm>
-            <a:off x="1809378" y="5215490"/>
+            <a:off x="1992258" y="5741996"/>
             <a:ext cx="7762829" cy="623943"/>
           </a:xfrm>
           <a:prstGeom prst="roundRect">

</xml_diff>

<commit_message>
Worked comments of Gertjan.
</commit_message>
<xml_diff>
--- a/Resources/Other/CompoundSets/Images/DeprecateCompoundSets.pptx
+++ b/Resources/Other/CompoundSets/Images/DeprecateCompoundSets.pptx
@@ -223,7 +223,7 @@
             <a:fld id="{B1603AB5-52B7-8045-BEFE-97F8347DAEAC}" type="datetimeFigureOut">
               <a:rPr lang="en-US" smtClean="0"/>
               <a:pPr/>
-              <a:t>5/28/2018</a:t>
+              <a:t>5/31/2018</a:t>
             </a:fld>
             <a:endParaRPr lang="en-US"/>
           </a:p>
@@ -391,7 +391,7 @@
             <a:fld id="{EFF03303-0379-0E48-9B93-EC7286F8FEE5}" type="datetimeFigureOut">
               <a:rPr lang="en-US" smtClean="0"/>
               <a:pPr/>
-              <a:t>5/28/2018</a:t>
+              <a:t>5/31/2018</a:t>
             </a:fld>
             <a:endParaRPr lang="en-US"/>
           </a:p>
@@ -5989,7 +5989,7 @@
             <a:pPr algn="ctr"/>
             <a:r>
               <a:rPr lang="en-US" dirty="0"/>
-              <a:t>1. original</a:t>
+              <a:t>1. Original</a:t>
             </a:r>
           </a:p>
         </p:txBody>
@@ -7339,21 +7339,6 @@
 </file>
 
 <file path=customXml/item1.xml><?xml version="1.0" encoding="utf-8"?>
-<p:properties xmlns:p="http://schemas.microsoft.com/office/2006/metadata/properties" xmlns:xsi="http://www.w3.org/2001/XMLSchema-instance" xmlns:pc="http://schemas.microsoft.com/office/infopath/2007/PartnerControls">
-  <documentManagement/>
-</p:properties>
-</file>
-
-<file path=customXml/item2.xml><?xml version="1.0" encoding="utf-8"?>
-<?mso-contentType ?>
-<FormTemplates xmlns="http://schemas.microsoft.com/sharepoint/v3/contenttype/forms">
-  <Display>DocumentLibraryForm</Display>
-  <Edit>DocumentLibraryForm</Edit>
-  <New>DocumentLibraryForm</New>
-</FormTemplates>
-</file>
-
-<file path=customXml/item3.xml><?xml version="1.0" encoding="utf-8"?>
 <ct:contentTypeSchema xmlns:ct="http://schemas.microsoft.com/office/2006/metadata/contentType" xmlns:ma="http://schemas.microsoft.com/office/2006/metadata/properties/metaAttributes" ct:_="" ma:_="" ma:contentTypeName="Document" ma:contentTypeID="0x0101003077E6D4C54119439DB8E5381724DDAA" ma:contentTypeVersion="3" ma:contentTypeDescription="Create a new document." ma:contentTypeScope="" ma:versionID="35325c12c4b8970beabc35f2e2efcbb5">
   <xsd:schema xmlns:xsd="http://www.w3.org/2001/XMLSchema" xmlns:xs="http://www.w3.org/2001/XMLSchema" xmlns:p="http://schemas.microsoft.com/office/2006/metadata/properties" xmlns:ns2="67d1ba68-3275-44c2-9ddb-2f8511f2ccbb" targetNamespace="http://schemas.microsoft.com/office/2006/metadata/properties" ma:root="true" ma:fieldsID="33e6c1fa542cdacee9e5295060f101a2" ns2:_="">
     <xsd:import namespace="67d1ba68-3275-44c2-9ddb-2f8511f2ccbb"/>
@@ -7507,31 +7492,22 @@
 </ct:contentTypeSchema>
 </file>
 
-<file path=customXml/itemProps1.xml><?xml version="1.0" encoding="utf-8"?>
-<ds:datastoreItem xmlns:ds="http://schemas.openxmlformats.org/officeDocument/2006/customXml" ds:itemID="{F4BD4880-0C9A-491D-872C-CB84E58DA4AE}">
-  <ds:schemaRefs>
-    <ds:schemaRef ds:uri="67d1ba68-3275-44c2-9ddb-2f8511f2ccbb"/>
-    <ds:schemaRef ds:uri="http://schemas.microsoft.com/office/2006/documentManagement/types"/>
-    <ds:schemaRef ds:uri="http://schemas.openxmlformats.org/package/2006/metadata/core-properties"/>
-    <ds:schemaRef ds:uri="http://purl.org/dc/elements/1.1/"/>
-    <ds:schemaRef ds:uri="http://purl.org/dc/terms/"/>
-    <ds:schemaRef ds:uri="http://schemas.microsoft.com/office/2006/metadata/properties"/>
-    <ds:schemaRef ds:uri="http://purl.org/dc/dcmitype/"/>
-    <ds:schemaRef ds:uri="http://schemas.microsoft.com/office/infopath/2007/PartnerControls"/>
-    <ds:schemaRef ds:uri="http://www.w3.org/XML/1998/namespace"/>
-  </ds:schemaRefs>
-</ds:datastoreItem>
+<file path=customXml/item2.xml><?xml version="1.0" encoding="utf-8"?>
+<?mso-contentType ?>
+<FormTemplates xmlns="http://schemas.microsoft.com/sharepoint/v3/contenttype/forms">
+  <Display>DocumentLibraryForm</Display>
+  <Edit>DocumentLibraryForm</Edit>
+  <New>DocumentLibraryForm</New>
+</FormTemplates>
 </file>
 
-<file path=customXml/itemProps2.xml><?xml version="1.0" encoding="utf-8"?>
-<ds:datastoreItem xmlns:ds="http://schemas.openxmlformats.org/officeDocument/2006/customXml" ds:itemID="{74BCA57B-8451-400D-AF6D-A9DBB4806AF2}">
-  <ds:schemaRefs>
-    <ds:schemaRef ds:uri="http://schemas.microsoft.com/sharepoint/v3/contenttype/forms"/>
-  </ds:schemaRefs>
-</ds:datastoreItem>
+<file path=customXml/item3.xml><?xml version="1.0" encoding="utf-8"?>
+<p:properties xmlns:p="http://schemas.microsoft.com/office/2006/metadata/properties" xmlns:xsi="http://www.w3.org/2001/XMLSchema-instance" xmlns:pc="http://schemas.microsoft.com/office/infopath/2007/PartnerControls">
+  <documentManagement/>
+</p:properties>
 </file>
 
-<file path=customXml/itemProps3.xml><?xml version="1.0" encoding="utf-8"?>
+<file path=customXml/itemProps1.xml><?xml version="1.0" encoding="utf-8"?>
 <ds:datastoreItem xmlns:ds="http://schemas.openxmlformats.org/officeDocument/2006/customXml" ds:itemID="{3A2EFE34-A918-4452-B6BD-4425E6B1970F}">
   <ds:schemaRefs>
     <ds:schemaRef ds:uri="http://schemas.microsoft.com/office/2006/metadata/contentType"/>
@@ -7547,4 +7523,28 @@
     <ds:schemaRef ds:uri="http://schemas.microsoft.com/internal/obd"/>
   </ds:schemaRefs>
 </ds:datastoreItem>
+</file>
+
+<file path=customXml/itemProps2.xml><?xml version="1.0" encoding="utf-8"?>
+<ds:datastoreItem xmlns:ds="http://schemas.openxmlformats.org/officeDocument/2006/customXml" ds:itemID="{74BCA57B-8451-400D-AF6D-A9DBB4806AF2}">
+  <ds:schemaRefs>
+    <ds:schemaRef ds:uri="http://schemas.microsoft.com/sharepoint/v3/contenttype/forms"/>
+  </ds:schemaRefs>
+</ds:datastoreItem>
+</file>
+
+<file path=customXml/itemProps3.xml><?xml version="1.0" encoding="utf-8"?>
+<ds:datastoreItem xmlns:ds="http://schemas.openxmlformats.org/officeDocument/2006/customXml" ds:itemID="{F4BD4880-0C9A-491D-872C-CB84E58DA4AE}">
+  <ds:schemaRefs>
+    <ds:schemaRef ds:uri="67d1ba68-3275-44c2-9ddb-2f8511f2ccbb"/>
+    <ds:schemaRef ds:uri="http://schemas.microsoft.com/office/2006/documentManagement/types"/>
+    <ds:schemaRef ds:uri="http://schemas.openxmlformats.org/package/2006/metadata/core-properties"/>
+    <ds:schemaRef ds:uri="http://purl.org/dc/elements/1.1/"/>
+    <ds:schemaRef ds:uri="http://purl.org/dc/terms/"/>
+    <ds:schemaRef ds:uri="http://schemas.microsoft.com/office/2006/metadata/properties"/>
+    <ds:schemaRef ds:uri="http://purl.org/dc/dcmitype/"/>
+    <ds:schemaRef ds:uri="http://schemas.microsoft.com/office/infopath/2007/PartnerControls"/>
+    <ds:schemaRef ds:uri="http://www.w3.org/XML/1998/namespace"/>
+  </ds:schemaRefs>
+</ds:datastoreItem>
 </file>
</xml_diff>

<commit_message>
Adapted document based on completed conversion of SFMM.
</commit_message>
<xml_diff>
--- a/Resources/Other/CompoundSets/Images/DeprecateCompoundSets.pptx
+++ b/Resources/Other/CompoundSets/Images/DeprecateCompoundSets.pptx
@@ -223,7 +223,7 @@
             <a:fld id="{B1603AB5-52B7-8045-BEFE-97F8347DAEAC}" type="datetimeFigureOut">
               <a:rPr lang="en-US" smtClean="0"/>
               <a:pPr/>
-              <a:t>5/31/2018</a:t>
+              <a:t>7/4/2018</a:t>
             </a:fld>
             <a:endParaRPr lang="en-US"/>
           </a:p>
@@ -391,7 +391,7 @@
             <a:fld id="{EFF03303-0379-0E48-9B93-EC7286F8FEE5}" type="datetimeFigureOut">
               <a:rPr lang="en-US" smtClean="0"/>
               <a:pPr/>
-              <a:t>5/31/2018</a:t>
+              <a:t>7/4/2018</a:t>
             </a:fld>
             <a:endParaRPr lang="en-US"/>
           </a:p>
@@ -5962,7 +5962,7 @@
         <p:spPr>
           <a:xfrm>
             <a:off x="853021" y="1118795"/>
-            <a:ext cx="3837313" cy="914400"/>
+            <a:ext cx="3837313" cy="720763"/>
           </a:xfrm>
           <a:prstGeom prst="roundRect">
             <a:avLst/>
@@ -6008,8 +6008,8 @@
         </p:nvSpPr>
         <p:spPr>
           <a:xfrm>
-            <a:off x="853021" y="2400748"/>
-            <a:ext cx="3837313" cy="914400"/>
+            <a:off x="853021" y="2172595"/>
+            <a:ext cx="3837313" cy="720763"/>
           </a:xfrm>
           <a:prstGeom prst="roundRect">
             <a:avLst/>
@@ -6063,8 +6063,8 @@
         </p:nvSpPr>
         <p:spPr>
           <a:xfrm>
-            <a:off x="853021" y="3682701"/>
-            <a:ext cx="3837313" cy="914400"/>
+            <a:off x="870740" y="3226396"/>
+            <a:ext cx="3837313" cy="720762"/>
           </a:xfrm>
           <a:prstGeom prst="roundRect">
             <a:avLst/>
@@ -6091,8 +6091,13 @@
             <a:pPr algn="ctr"/>
             <a:r>
               <a:rPr lang="en-US" dirty="0"/>
-              <a:t>3. With set mappings</a:t>
-            </a:r>
+              <a:t>3. Rewrite compound set </a:t>
+            </a:r>
+            <a:r>
+              <a:rPr lang="en-US" dirty="0" err="1"/>
+              <a:t>defs</a:t>
+            </a:r>
+            <a:endParaRPr lang="en-US" dirty="0"/>
           </a:p>
         </p:txBody>
       </p:sp>
@@ -6110,8 +6115,8 @@
         </p:nvSpPr>
         <p:spPr>
           <a:xfrm>
-            <a:off x="853021" y="4964654"/>
-            <a:ext cx="3837313" cy="914400"/>
+            <a:off x="870740" y="4297680"/>
+            <a:ext cx="3837313" cy="720762"/>
           </a:xfrm>
           <a:prstGeom prst="roundRect">
             <a:avLst/>
@@ -6137,12 +6142,8 @@
           <a:p>
             <a:pPr algn="ctr"/>
             <a:r>
-              <a:rPr lang="en-US"/>
-              <a:t>4. </a:t>
-            </a:r>
-            <a:r>
               <a:rPr lang="en-US" dirty="0"/>
-              <a:t>With shadow cases</a:t>
+              <a:t>4. With set mappings</a:t>
             </a:r>
           </a:p>
         </p:txBody>
@@ -6161,8 +6162,8 @@
         </p:nvSpPr>
         <p:spPr>
           <a:xfrm>
-            <a:off x="5583011" y="2400748"/>
-            <a:ext cx="3837313" cy="914400"/>
+            <a:off x="5583011" y="2168617"/>
+            <a:ext cx="3837313" cy="724741"/>
           </a:xfrm>
           <a:prstGeom prst="roundRect">
             <a:avLst/>
@@ -6189,7 +6190,7 @@
             <a:pPr algn="ctr"/>
             <a:r>
               <a:rPr lang="en-US" dirty="0"/>
-              <a:t>6. Compiling again</a:t>
+              <a:t>7. Compiling again</a:t>
             </a:r>
           </a:p>
         </p:txBody>
@@ -6208,8 +6209,8 @@
         </p:nvSpPr>
         <p:spPr>
           <a:xfrm>
-            <a:off x="5583010" y="3648635"/>
-            <a:ext cx="3837313" cy="914400"/>
+            <a:off x="5583011" y="3226396"/>
+            <a:ext cx="3837313" cy="720762"/>
           </a:xfrm>
           <a:prstGeom prst="roundRect">
             <a:avLst/>
@@ -6236,7 +6237,7 @@
             <a:pPr algn="ctr"/>
             <a:r>
               <a:rPr lang="en-US" dirty="0"/>
-              <a:t>7. With atomic cases</a:t>
+              <a:t>8. With atomic cases</a:t>
             </a:r>
           </a:p>
         </p:txBody>
@@ -6255,8 +6256,8 @@
         </p:nvSpPr>
         <p:spPr>
           <a:xfrm>
-            <a:off x="5583009" y="4900892"/>
-            <a:ext cx="3837313" cy="914400"/>
+            <a:off x="5583011" y="4297680"/>
+            <a:ext cx="3837313" cy="720762"/>
           </a:xfrm>
           <a:prstGeom prst="roundRect">
             <a:avLst/>
@@ -6283,7 +6284,7 @@
             <a:pPr algn="ctr"/>
             <a:r>
               <a:rPr lang="en-US" dirty="0"/>
-              <a:t>8. Without </a:t>
+              <a:t>9. Without </a:t>
             </a:r>
             <a:r>
               <a:rPr lang="en-US" dirty="0" err="1"/>
@@ -6311,7 +6312,7 @@
         <p:spPr>
           <a:xfrm>
             <a:off x="5583008" y="1118795"/>
-            <a:ext cx="3837313" cy="914400"/>
+            <a:ext cx="3837313" cy="720763"/>
           </a:xfrm>
           <a:prstGeom prst="roundRect">
             <a:avLst/>
@@ -6338,8 +6339,99 @@
             <a:pPr algn="ctr"/>
             <a:r>
               <a:rPr lang="en-US" dirty="0"/>
-              <a:t>5. Compound indexes moved</a:t>
-            </a:r>
+              <a:t>6. Compound indexes moved</a:t>
+            </a:r>
+          </a:p>
+        </p:txBody>
+      </p:sp>
+      <p:sp>
+        <p:nvSpPr>
+          <p:cNvPr id="12" name="Rectangle: Rounded Corners 11">
+            <a:extLst>
+              <a:ext uri="{FF2B5EF4-FFF2-40B4-BE49-F238E27FC236}">
+                <a16:creationId xmlns:a16="http://schemas.microsoft.com/office/drawing/2014/main" id="{F7D53FC2-9D5F-4BFC-840F-BF1E57C6CC5A}"/>
+              </a:ext>
+            </a:extLst>
+          </p:cNvPr>
+          <p:cNvSpPr/>
+          <p:nvPr/>
+        </p:nvSpPr>
+        <p:spPr>
+          <a:xfrm>
+            <a:off x="870740" y="5368964"/>
+            <a:ext cx="3837313" cy="720762"/>
+          </a:xfrm>
+          <a:prstGeom prst="roundRect">
+            <a:avLst/>
+          </a:prstGeom>
+        </p:spPr>
+        <p:style>
+          <a:lnRef idx="1">
+            <a:schemeClr val="accent1"/>
+          </a:lnRef>
+          <a:fillRef idx="3">
+            <a:schemeClr val="accent1"/>
+          </a:fillRef>
+          <a:effectRef idx="2">
+            <a:schemeClr val="accent1"/>
+          </a:effectRef>
+          <a:fontRef idx="minor">
+            <a:schemeClr val="lt1"/>
+          </a:fontRef>
+        </p:style>
+        <p:txBody>
+          <a:bodyPr rtlCol="0" anchor="ctr"/>
+          <a:lstStyle/>
+          <a:p>
+            <a:pPr algn="ctr"/>
+            <a:r>
+              <a:rPr lang="en-US" dirty="0"/>
+              <a:t>5. With shadow cases</a:t>
+            </a:r>
+          </a:p>
+        </p:txBody>
+      </p:sp>
+      <p:sp>
+        <p:nvSpPr>
+          <p:cNvPr id="13" name="Rectangle: Rounded Corners 12">
+            <a:extLst>
+              <a:ext uri="{FF2B5EF4-FFF2-40B4-BE49-F238E27FC236}">
+                <a16:creationId xmlns:a16="http://schemas.microsoft.com/office/drawing/2014/main" id="{11AA10AA-5FA7-4932-9772-47F39719985D}"/>
+              </a:ext>
+            </a:extLst>
+          </p:cNvPr>
+          <p:cNvSpPr/>
+          <p:nvPr/>
+        </p:nvSpPr>
+        <p:spPr>
+          <a:xfrm>
+            <a:off x="5583011" y="5368964"/>
+            <a:ext cx="3837313" cy="720762"/>
+          </a:xfrm>
+          <a:prstGeom prst="roundRect">
+            <a:avLst/>
+          </a:prstGeom>
+        </p:spPr>
+        <p:style>
+          <a:lnRef idx="1">
+            <a:schemeClr val="accent1"/>
+          </a:lnRef>
+          <a:fillRef idx="3">
+            <a:schemeClr val="accent1"/>
+          </a:fillRef>
+          <a:effectRef idx="2">
+            <a:schemeClr val="accent1"/>
+          </a:effectRef>
+          <a:fontRef idx="minor">
+            <a:schemeClr val="lt1"/>
+          </a:fontRef>
+        </p:style>
+        <p:txBody>
+          <a:bodyPr rtlCol="0" anchor="ctr"/>
+          <a:lstStyle/>
+          <a:p>
+            <a:pPr algn="ctr"/>
+            <a:endParaRPr lang="en-US" dirty="0"/>
           </a:p>
         </p:txBody>
       </p:sp>
@@ -7339,6 +7431,21 @@
 </file>
 
 <file path=customXml/item1.xml><?xml version="1.0" encoding="utf-8"?>
+<p:properties xmlns:p="http://schemas.microsoft.com/office/2006/metadata/properties" xmlns:xsi="http://www.w3.org/2001/XMLSchema-instance" xmlns:pc="http://schemas.microsoft.com/office/infopath/2007/PartnerControls">
+  <documentManagement/>
+</p:properties>
+</file>
+
+<file path=customXml/item2.xml><?xml version="1.0" encoding="utf-8"?>
+<?mso-contentType ?>
+<FormTemplates xmlns="http://schemas.microsoft.com/sharepoint/v3/contenttype/forms">
+  <Display>DocumentLibraryForm</Display>
+  <Edit>DocumentLibraryForm</Edit>
+  <New>DocumentLibraryForm</New>
+</FormTemplates>
+</file>
+
+<file path=customXml/item3.xml><?xml version="1.0" encoding="utf-8"?>
 <ct:contentTypeSchema xmlns:ct="http://schemas.microsoft.com/office/2006/metadata/contentType" xmlns:ma="http://schemas.microsoft.com/office/2006/metadata/properties/metaAttributes" ct:_="" ma:_="" ma:contentTypeName="Document" ma:contentTypeID="0x0101003077E6D4C54119439DB8E5381724DDAA" ma:contentTypeVersion="3" ma:contentTypeDescription="Create a new document." ma:contentTypeScope="" ma:versionID="35325c12c4b8970beabc35f2e2efcbb5">
   <xsd:schema xmlns:xsd="http://www.w3.org/2001/XMLSchema" xmlns:xs="http://www.w3.org/2001/XMLSchema" xmlns:p="http://schemas.microsoft.com/office/2006/metadata/properties" xmlns:ns2="67d1ba68-3275-44c2-9ddb-2f8511f2ccbb" targetNamespace="http://schemas.microsoft.com/office/2006/metadata/properties" ma:root="true" ma:fieldsID="33e6c1fa542cdacee9e5295060f101a2" ns2:_="">
     <xsd:import namespace="67d1ba68-3275-44c2-9ddb-2f8511f2ccbb"/>
@@ -7492,22 +7599,31 @@
 </ct:contentTypeSchema>
 </file>
 
-<file path=customXml/item2.xml><?xml version="1.0" encoding="utf-8"?>
-<?mso-contentType ?>
-<FormTemplates xmlns="http://schemas.microsoft.com/sharepoint/v3/contenttype/forms">
-  <Display>DocumentLibraryForm</Display>
-  <Edit>DocumentLibraryForm</Edit>
-  <New>DocumentLibraryForm</New>
-</FormTemplates>
+<file path=customXml/itemProps1.xml><?xml version="1.0" encoding="utf-8"?>
+<ds:datastoreItem xmlns:ds="http://schemas.openxmlformats.org/officeDocument/2006/customXml" ds:itemID="{F4BD4880-0C9A-491D-872C-CB84E58DA4AE}">
+  <ds:schemaRefs>
+    <ds:schemaRef ds:uri="http://schemas.microsoft.com/office/2006/metadata/properties"/>
+    <ds:schemaRef ds:uri="67d1ba68-3275-44c2-9ddb-2f8511f2ccbb"/>
+    <ds:schemaRef ds:uri="http://schemas.microsoft.com/office/2006/documentManagement/types"/>
+    <ds:schemaRef ds:uri="http://purl.org/dc/elements/1.1/"/>
+    <ds:schemaRef ds:uri="http://www.w3.org/XML/1998/namespace"/>
+    <ds:schemaRef ds:uri="http://schemas.microsoft.com/office/infopath/2007/PartnerControls"/>
+    <ds:schemaRef ds:uri="http://purl.org/dc/dcmitype/"/>
+    <ds:schemaRef ds:uri="http://schemas.openxmlformats.org/package/2006/metadata/core-properties"/>
+    <ds:schemaRef ds:uri="http://purl.org/dc/terms/"/>
+  </ds:schemaRefs>
+</ds:datastoreItem>
 </file>
 
-<file path=customXml/item3.xml><?xml version="1.0" encoding="utf-8"?>
-<p:properties xmlns:p="http://schemas.microsoft.com/office/2006/metadata/properties" xmlns:xsi="http://www.w3.org/2001/XMLSchema-instance" xmlns:pc="http://schemas.microsoft.com/office/infopath/2007/PartnerControls">
-  <documentManagement/>
-</p:properties>
+<file path=customXml/itemProps2.xml><?xml version="1.0" encoding="utf-8"?>
+<ds:datastoreItem xmlns:ds="http://schemas.openxmlformats.org/officeDocument/2006/customXml" ds:itemID="{74BCA57B-8451-400D-AF6D-A9DBB4806AF2}">
+  <ds:schemaRefs>
+    <ds:schemaRef ds:uri="http://schemas.microsoft.com/sharepoint/v3/contenttype/forms"/>
+  </ds:schemaRefs>
+</ds:datastoreItem>
 </file>
 
-<file path=customXml/itemProps1.xml><?xml version="1.0" encoding="utf-8"?>
+<file path=customXml/itemProps3.xml><?xml version="1.0" encoding="utf-8"?>
 <ds:datastoreItem xmlns:ds="http://schemas.openxmlformats.org/officeDocument/2006/customXml" ds:itemID="{3A2EFE34-A918-4452-B6BD-4425E6B1970F}">
   <ds:schemaRefs>
     <ds:schemaRef ds:uri="http://schemas.microsoft.com/office/2006/metadata/contentType"/>
@@ -7523,28 +7639,4 @@
     <ds:schemaRef ds:uri="http://schemas.microsoft.com/internal/obd"/>
   </ds:schemaRefs>
 </ds:datastoreItem>
-</file>
-
-<file path=customXml/itemProps2.xml><?xml version="1.0" encoding="utf-8"?>
-<ds:datastoreItem xmlns:ds="http://schemas.openxmlformats.org/officeDocument/2006/customXml" ds:itemID="{74BCA57B-8451-400D-AF6D-A9DBB4806AF2}">
-  <ds:schemaRefs>
-    <ds:schemaRef ds:uri="http://schemas.microsoft.com/sharepoint/v3/contenttype/forms"/>
-  </ds:schemaRefs>
-</ds:datastoreItem>
-</file>
-
-<file path=customXml/itemProps3.xml><?xml version="1.0" encoding="utf-8"?>
-<ds:datastoreItem xmlns:ds="http://schemas.openxmlformats.org/officeDocument/2006/customXml" ds:itemID="{F4BD4880-0C9A-491D-872C-CB84E58DA4AE}">
-  <ds:schemaRefs>
-    <ds:schemaRef ds:uri="67d1ba68-3275-44c2-9ddb-2f8511f2ccbb"/>
-    <ds:schemaRef ds:uri="http://schemas.microsoft.com/office/2006/documentManagement/types"/>
-    <ds:schemaRef ds:uri="http://schemas.openxmlformats.org/package/2006/metadata/core-properties"/>
-    <ds:schemaRef ds:uri="http://purl.org/dc/elements/1.1/"/>
-    <ds:schemaRef ds:uri="http://purl.org/dc/terms/"/>
-    <ds:schemaRef ds:uri="http://schemas.microsoft.com/office/2006/metadata/properties"/>
-    <ds:schemaRef ds:uri="http://purl.org/dc/dcmitype/"/>
-    <ds:schemaRef ds:uri="http://schemas.microsoft.com/office/infopath/2007/PartnerControls"/>
-    <ds:schemaRef ds:uri="http://www.w3.org/XML/1998/namespace"/>
-  </ds:schemaRefs>
-</ds:datastoreItem>
 </file>
</xml_diff>